<commit_message>
Updating expected file structure image
</commit_message>
<xml_diff>
--- a/img/file_structure.pptx
+++ b/img/file_structure.pptx
@@ -125,12 +125,12 @@
   <pc:docChgLst>
     <pc:chgData name="Samuel Huguet" userId="4578c951471d7f2a" providerId="LiveId" clId="{15DC2BB1-AB5F-4445-BE4B-0EA8B723DC84}"/>
     <pc:docChg chg="undo custSel modSld">
-      <pc:chgData name="Samuel Huguet" userId="4578c951471d7f2a" providerId="LiveId" clId="{15DC2BB1-AB5F-4445-BE4B-0EA8B723DC84}" dt="2021-08-19T17:19:13.384" v="681" actId="14100"/>
+      <pc:chgData name="Samuel Huguet" userId="4578c951471d7f2a" providerId="LiveId" clId="{15DC2BB1-AB5F-4445-BE4B-0EA8B723DC84}" dt="2021-09-03T11:47:04.945" v="683" actId="20577"/>
       <pc:docMkLst>
         <pc:docMk/>
       </pc:docMkLst>
       <pc:sldChg chg="addSp delSp modSp mod">
-        <pc:chgData name="Samuel Huguet" userId="4578c951471d7f2a" providerId="LiveId" clId="{15DC2BB1-AB5F-4445-BE4B-0EA8B723DC84}" dt="2021-08-19T17:19:13.384" v="681" actId="14100"/>
+        <pc:chgData name="Samuel Huguet" userId="4578c951471d7f2a" providerId="LiveId" clId="{15DC2BB1-AB5F-4445-BE4B-0EA8B723DC84}" dt="2021-09-03T11:47:04.945" v="683" actId="20577"/>
         <pc:sldMkLst>
           <pc:docMk/>
           <pc:sldMk cId="1152007807" sldId="256"/>
@@ -552,7 +552,7 @@
           </ac:spMkLst>
         </pc:spChg>
         <pc:spChg chg="add mod">
-          <ac:chgData name="Samuel Huguet" userId="4578c951471d7f2a" providerId="LiveId" clId="{15DC2BB1-AB5F-4445-BE4B-0EA8B723DC84}" dt="2021-08-19T17:14:32.638" v="445" actId="1076"/>
+          <ac:chgData name="Samuel Huguet" userId="4578c951471d7f2a" providerId="LiveId" clId="{15DC2BB1-AB5F-4445-BE4B-0EA8B723DC84}" dt="2021-09-03T11:47:04.945" v="683" actId="20577"/>
           <ac:spMkLst>
             <pc:docMk/>
             <pc:sldMk cId="1152007807" sldId="256"/>
@@ -1616,7 +1616,7 @@
           <a:p>
             <a:fld id="{DE30D2D3-B5F9-45AD-ACA0-65C0B13DC951}" type="datetimeFigureOut">
               <a:rPr lang="en-GB" smtClean="0"/>
-              <a:t>19/08/2021</a:t>
+              <a:t>03/09/2021</a:t>
             </a:fld>
             <a:endParaRPr lang="en-GB"/>
           </a:p>
@@ -1786,7 +1786,7 @@
           <a:p>
             <a:fld id="{DE30D2D3-B5F9-45AD-ACA0-65C0B13DC951}" type="datetimeFigureOut">
               <a:rPr lang="en-GB" smtClean="0"/>
-              <a:t>19/08/2021</a:t>
+              <a:t>03/09/2021</a:t>
             </a:fld>
             <a:endParaRPr lang="en-GB"/>
           </a:p>
@@ -1966,7 +1966,7 @@
           <a:p>
             <a:fld id="{DE30D2D3-B5F9-45AD-ACA0-65C0B13DC951}" type="datetimeFigureOut">
               <a:rPr lang="en-GB" smtClean="0"/>
-              <a:t>19/08/2021</a:t>
+              <a:t>03/09/2021</a:t>
             </a:fld>
             <a:endParaRPr lang="en-GB"/>
           </a:p>
@@ -2136,7 +2136,7 @@
           <a:p>
             <a:fld id="{DE30D2D3-B5F9-45AD-ACA0-65C0B13DC951}" type="datetimeFigureOut">
               <a:rPr lang="en-GB" smtClean="0"/>
-              <a:t>19/08/2021</a:t>
+              <a:t>03/09/2021</a:t>
             </a:fld>
             <a:endParaRPr lang="en-GB"/>
           </a:p>
@@ -2380,7 +2380,7 @@
           <a:p>
             <a:fld id="{DE30D2D3-B5F9-45AD-ACA0-65C0B13DC951}" type="datetimeFigureOut">
               <a:rPr lang="en-GB" smtClean="0"/>
-              <a:t>19/08/2021</a:t>
+              <a:t>03/09/2021</a:t>
             </a:fld>
             <a:endParaRPr lang="en-GB"/>
           </a:p>
@@ -2612,7 +2612,7 @@
           <a:p>
             <a:fld id="{DE30D2D3-B5F9-45AD-ACA0-65C0B13DC951}" type="datetimeFigureOut">
               <a:rPr lang="en-GB" smtClean="0"/>
-              <a:t>19/08/2021</a:t>
+              <a:t>03/09/2021</a:t>
             </a:fld>
             <a:endParaRPr lang="en-GB"/>
           </a:p>
@@ -2979,7 +2979,7 @@
           <a:p>
             <a:fld id="{DE30D2D3-B5F9-45AD-ACA0-65C0B13DC951}" type="datetimeFigureOut">
               <a:rPr lang="en-GB" smtClean="0"/>
-              <a:t>19/08/2021</a:t>
+              <a:t>03/09/2021</a:t>
             </a:fld>
             <a:endParaRPr lang="en-GB"/>
           </a:p>
@@ -3097,7 +3097,7 @@
           <a:p>
             <a:fld id="{DE30D2D3-B5F9-45AD-ACA0-65C0B13DC951}" type="datetimeFigureOut">
               <a:rPr lang="en-GB" smtClean="0"/>
-              <a:t>19/08/2021</a:t>
+              <a:t>03/09/2021</a:t>
             </a:fld>
             <a:endParaRPr lang="en-GB"/>
           </a:p>
@@ -3192,7 +3192,7 @@
           <a:p>
             <a:fld id="{DE30D2D3-B5F9-45AD-ACA0-65C0B13DC951}" type="datetimeFigureOut">
               <a:rPr lang="en-GB" smtClean="0"/>
-              <a:t>19/08/2021</a:t>
+              <a:t>03/09/2021</a:t>
             </a:fld>
             <a:endParaRPr lang="en-GB"/>
           </a:p>
@@ -3469,7 +3469,7 @@
           <a:p>
             <a:fld id="{DE30D2D3-B5F9-45AD-ACA0-65C0B13DC951}" type="datetimeFigureOut">
               <a:rPr lang="en-GB" smtClean="0"/>
-              <a:t>19/08/2021</a:t>
+              <a:t>03/09/2021</a:t>
             </a:fld>
             <a:endParaRPr lang="en-GB"/>
           </a:p>
@@ -3726,7 +3726,7 @@
           <a:p>
             <a:fld id="{DE30D2D3-B5F9-45AD-ACA0-65C0B13DC951}" type="datetimeFigureOut">
               <a:rPr lang="en-GB" smtClean="0"/>
-              <a:t>19/08/2021</a:t>
+              <a:t>03/09/2021</a:t>
             </a:fld>
             <a:endParaRPr lang="en-GB"/>
           </a:p>
@@ -3939,7 +3939,7 @@
           <a:p>
             <a:fld id="{DE30D2D3-B5F9-45AD-ACA0-65C0B13DC951}" type="datetimeFigureOut">
               <a:rPr lang="en-GB" smtClean="0"/>
-              <a:t>19/08/2021</a:t>
+              <a:t>03/09/2021</a:t>
             </a:fld>
             <a:endParaRPr lang="en-GB"/>
           </a:p>
@@ -7112,14 +7112,20 @@
           <a:lstStyle/>
           <a:p>
             <a:r>
-              <a:rPr lang="en-GB" sz="1400" dirty="0">
+              <a:rPr lang="en-GB" sz="1400" dirty="0" err="1">
                 <a:solidFill>
                   <a:schemeClr val="bg1"/>
                 </a:solidFill>
                 <a:latin typeface="Consolas" panose="020B0609020204030204" pitchFamily="49" charset="0"/>
               </a:rPr>
-              <a:t>Well_1</a:t>
-            </a:r>
+              <a:t>Well_n</a:t>
+            </a:r>
+            <a:endParaRPr lang="en-GB" sz="1400" dirty="0">
+              <a:solidFill>
+                <a:schemeClr val="bg1"/>
+              </a:solidFill>
+              <a:latin typeface="Consolas" panose="020B0609020204030204" pitchFamily="49" charset="0"/>
+            </a:endParaRPr>
           </a:p>
         </p:txBody>
       </p:sp>

</xml_diff>